<commit_message>
Finalized element layout; now implemented.
</commit_message>
<xml_diff>
--- a/Planning/Element Layout.pptx
+++ b/Planning/Element Layout.pptx
@@ -5922,6 +5922,44 @@
           </a:fontRef>
         </p:style>
       </p:cxnSp>
+      <p:sp>
+        <p:nvSpPr>
+          <p:cNvPr id="115" name="TextBox 114"/>
+          <p:cNvSpPr txBox="1"/>
+          <p:nvPr/>
+        </p:nvSpPr>
+        <p:spPr>
+          <a:xfrm>
+            <a:off x="130935" y="65470"/>
+            <a:ext cx="6481160" cy="646331"/>
+          </a:xfrm>
+          <a:prstGeom prst="rect">
+            <a:avLst/>
+          </a:prstGeom>
+          <a:noFill/>
+        </p:spPr>
+        <p:txBody>
+          <a:bodyPr wrap="square" rtlCol="0">
+            <a:spAutoFit/>
+          </a:bodyPr>
+          <a:lstStyle/>
+          <a:p>
+            <a:r>
+              <a:rPr lang="en-US" dirty="0" smtClean="0">
+                <a:solidFill>
+                  <a:schemeClr val="accent2"/>
+                </a:solidFill>
+              </a:rPr>
+              <a:t>Issue: Wrapper base classes would actually be different for Element versions, so we need to ensure that constructors would work.</a:t>
+            </a:r>
+            <a:endParaRPr lang="en-US" dirty="0">
+              <a:solidFill>
+                <a:schemeClr val="accent2"/>
+              </a:solidFill>
+            </a:endParaRPr>
+          </a:p>
+        </p:txBody>
+      </p:sp>
     </p:spTree>
     <p:extLst>
       <p:ext uri="{BB962C8B-B14F-4D97-AF65-F5344CB8AC3E}">

</xml_diff>